<commit_message>
added numbers to lists, slide to PP
</commit_message>
<xml_diff>
--- a/Project 1.pptx
+++ b/Project 1.pptx
@@ -5,13 +5,15 @@
     <p:sldMasterId id="2147483660" r:id="rId1"/>
   </p:sldMasterIdLst>
   <p:notesMasterIdLst>
-    <p:notesMasterId r:id="rId6"/>
+    <p:notesMasterId r:id="rId8"/>
   </p:notesMasterIdLst>
   <p:sldIdLst>
     <p:sldId id="256" r:id="rId2"/>
-    <p:sldId id="258" r:id="rId3"/>
-    <p:sldId id="260" r:id="rId4"/>
-    <p:sldId id="261" r:id="rId5"/>
+    <p:sldId id="262" r:id="rId3"/>
+    <p:sldId id="258" r:id="rId4"/>
+    <p:sldId id="260" r:id="rId5"/>
+    <p:sldId id="261" r:id="rId6"/>
+    <p:sldId id="263" r:id="rId7"/>
   </p:sldIdLst>
   <p:sldSz cx="9144000" cy="6858000" type="screen4x3"/>
   <p:notesSz cx="6858000" cy="9144000"/>
@@ -110,6 +112,22 @@
       </a:defRPr>
     </a:lvl9pPr>
   </p:defaultTextStyle>
+  <p:extLst>
+    <p:ext uri="{EFAFB233-063F-42B5-8137-9DF3F51BA10A}">
+      <p15:sldGuideLst xmlns:p15="http://schemas.microsoft.com/office/powerpoint/2012/main">
+        <p15:guide id="1" orient="horz" pos="2160">
+          <p15:clr>
+            <a:srgbClr val="A4A3A4"/>
+          </p15:clr>
+        </p15:guide>
+        <p15:guide id="2" pos="2880">
+          <p15:clr>
+            <a:srgbClr val="A4A3A4"/>
+          </p15:clr>
+        </p15:guide>
+      </p15:sldGuideLst>
+    </p:ext>
+  </p:extLst>
 </p:presentation>
 </file>
 
@@ -195,7 +213,7 @@
           <a:p>
             <a:fld id="{4F909C2F-3E5B-4634-96A8-1378B030B86E}" type="datetimeFigureOut">
               <a:rPr lang="en-US" smtClean="0"/>
-              <a:t>4/12/2022</a:t>
+              <a:t>4/13/2022</a:t>
             </a:fld>
             <a:endParaRPr lang="en-US"/>
           </a:p>
@@ -678,7 +696,7 @@
           <a:p>
             <a:fld id="{0C36B450-794D-49EA-A921-4CF5282E3E27}" type="datetimeFigureOut">
               <a:rPr lang="en-US" smtClean="0"/>
-              <a:t>4/12/2022</a:t>
+              <a:t>4/13/2022</a:t>
             </a:fld>
             <a:endParaRPr lang="en-US"/>
           </a:p>
@@ -904,7 +922,7 @@
           <a:p>
             <a:fld id="{0C36B450-794D-49EA-A921-4CF5282E3E27}" type="datetimeFigureOut">
               <a:rPr lang="en-US" smtClean="0"/>
-              <a:t>4/12/2022</a:t>
+              <a:t>4/13/2022</a:t>
             </a:fld>
             <a:endParaRPr lang="en-US"/>
           </a:p>
@@ -1079,7 +1097,7 @@
           <a:p>
             <a:fld id="{0C36B450-794D-49EA-A921-4CF5282E3E27}" type="datetimeFigureOut">
               <a:rPr lang="en-US" smtClean="0"/>
-              <a:t>4/12/2022</a:t>
+              <a:t>4/13/2022</a:t>
             </a:fld>
             <a:endParaRPr lang="en-US"/>
           </a:p>
@@ -1244,7 +1262,7 @@
           <a:p>
             <a:fld id="{0C36B450-794D-49EA-A921-4CF5282E3E27}" type="datetimeFigureOut">
               <a:rPr lang="en-US" smtClean="0"/>
-              <a:t>4/12/2022</a:t>
+              <a:t>4/13/2022</a:t>
             </a:fld>
             <a:endParaRPr lang="en-US"/>
           </a:p>
@@ -1488,7 +1506,7 @@
           <a:p>
             <a:fld id="{0C36B450-794D-49EA-A921-4CF5282E3E27}" type="datetimeFigureOut">
               <a:rPr lang="en-US" smtClean="0"/>
-              <a:t>4/12/2022</a:t>
+              <a:t>4/13/2022</a:t>
             </a:fld>
             <a:endParaRPr lang="en-US"/>
           </a:p>
@@ -1752,7 +1770,7 @@
           <a:p>
             <a:fld id="{0C36B450-794D-49EA-A921-4CF5282E3E27}" type="datetimeFigureOut">
               <a:rPr lang="en-US" smtClean="0"/>
-              <a:t>4/12/2022</a:t>
+              <a:t>4/13/2022</a:t>
             </a:fld>
             <a:endParaRPr lang="en-US"/>
           </a:p>
@@ -2126,7 +2144,7 @@
           <a:p>
             <a:fld id="{0C36B450-794D-49EA-A921-4CF5282E3E27}" type="datetimeFigureOut">
               <a:rPr lang="en-US" smtClean="0"/>
-              <a:t>4/12/2022</a:t>
+              <a:t>4/13/2022</a:t>
             </a:fld>
             <a:endParaRPr lang="en-US"/>
           </a:p>
@@ -2239,7 +2257,7 @@
           <a:p>
             <a:fld id="{0C36B450-794D-49EA-A921-4CF5282E3E27}" type="datetimeFigureOut">
               <a:rPr lang="en-US" smtClean="0"/>
-              <a:t>4/12/2022</a:t>
+              <a:t>4/13/2022</a:t>
             </a:fld>
             <a:endParaRPr lang="en-US"/>
           </a:p>
@@ -2329,7 +2347,7 @@
           <a:p>
             <a:fld id="{0C36B450-794D-49EA-A921-4CF5282E3E27}" type="datetimeFigureOut">
               <a:rPr lang="en-US" smtClean="0"/>
-              <a:t>4/12/2022</a:t>
+              <a:t>4/13/2022</a:t>
             </a:fld>
             <a:endParaRPr lang="en-US"/>
           </a:p>
@@ -2587,7 +2605,7 @@
           <a:p>
             <a:fld id="{0C36B450-794D-49EA-A921-4CF5282E3E27}" type="datetimeFigureOut">
               <a:rPr lang="en-US" smtClean="0"/>
-              <a:t>4/12/2022</a:t>
+              <a:t>4/13/2022</a:t>
             </a:fld>
             <a:endParaRPr lang="en-US"/>
           </a:p>
@@ -2851,7 +2869,7 @@
           <a:p>
             <a:fld id="{0C36B450-794D-49EA-A921-4CF5282E3E27}" type="datetimeFigureOut">
               <a:rPr lang="en-US" smtClean="0"/>
-              <a:t>4/12/2022</a:t>
+              <a:t>4/13/2022</a:t>
             </a:fld>
             <a:endParaRPr lang="en-US"/>
           </a:p>
@@ -3068,7 +3086,7 @@
           <a:p>
             <a:fld id="{0C36B450-794D-49EA-A921-4CF5282E3E27}" type="datetimeFigureOut">
               <a:rPr lang="en-US" smtClean="0"/>
-              <a:t>4/12/2022</a:t>
+              <a:t>4/13/2022</a:t>
             </a:fld>
             <a:endParaRPr lang="en-US"/>
           </a:p>
@@ -3635,132 +3653,45 @@
           <a:p>
             <a:r>
               <a:rPr lang="en-US" dirty="0" smtClean="0"/>
-              <a:t>Overview </a:t>
+              <a:t>Landing Page</a:t>
             </a:r>
             <a:endParaRPr lang="en-US" dirty="0"/>
           </a:p>
         </p:txBody>
       </p:sp>
-      <p:sp>
-        <p:nvSpPr>
-          <p:cNvPr id="3" name="TextBox 2"/>
-          <p:cNvSpPr txBox="1"/>
-          <p:nvPr/>
-        </p:nvSpPr>
+      <p:pic>
+        <p:nvPicPr>
+          <p:cNvPr id="4" name="Content Placeholder 3"/>
+          <p:cNvPicPr>
+            <a:picLocks noGrp="1" noChangeAspect="1"/>
+          </p:cNvPicPr>
+          <p:nvPr>
+            <p:ph idx="1"/>
+          </p:nvPr>
+        </p:nvPicPr>
+        <p:blipFill>
+          <a:blip r:embed="rId2">
+            <a:extLst>
+              <a:ext uri="{28A0092B-C50C-407E-A947-70E740481C1C}">
+                <a14:useLocalDpi xmlns:a14="http://schemas.microsoft.com/office/drawing/2010/main" val="0"/>
+              </a:ext>
+            </a:extLst>
+          </a:blip>
+          <a:stretch>
+            <a:fillRect/>
+          </a:stretch>
+        </p:blipFill>
         <p:spPr>
           <a:xfrm>
-            <a:off x="1143000" y="2075329"/>
-            <a:ext cx="6781800" cy="3785652"/>
+            <a:off x="691827" y="1600200"/>
+            <a:ext cx="7760346" cy="4708525"/>
           </a:xfrm>
-          <a:prstGeom prst="rect">
-            <a:avLst/>
-          </a:prstGeom>
-          <a:noFill/>
         </p:spPr>
-        <p:txBody>
-          <a:bodyPr wrap="square" rtlCol="0">
-            <a:spAutoFit/>
-          </a:bodyPr>
-          <a:lstStyle/>
-          <a:p>
-            <a:pPr>
-              <a:lnSpc>
-                <a:spcPct val="200000"/>
-              </a:lnSpc>
-            </a:pPr>
-            <a:r>
-              <a:rPr lang="en-US" sz="2000" dirty="0"/>
-              <a:t>A</a:t>
-            </a:r>
-            <a:r>
-              <a:rPr lang="en-US" sz="2000" dirty="0" smtClean="0"/>
-              <a:t> </a:t>
-            </a:r>
-            <a:r>
-              <a:rPr lang="en-US" sz="2000" dirty="0"/>
-              <a:t>RESTful API was </a:t>
-            </a:r>
-            <a:r>
-              <a:rPr lang="en-US" sz="2000" dirty="0" smtClean="0"/>
-              <a:t>created using: </a:t>
-            </a:r>
-          </a:p>
-          <a:p>
-            <a:pPr marL="285750" indent="-285750">
-              <a:lnSpc>
-                <a:spcPct val="200000"/>
-              </a:lnSpc>
-              <a:buFont typeface="Arial" panose="020B0604020202020204" pitchFamily="34" charset="0"/>
-              <a:buChar char="•"/>
-            </a:pPr>
-            <a:r>
-              <a:rPr lang="en-US" sz="2000" dirty="0" err="1" smtClean="0"/>
-              <a:t>Javascript</a:t>
-            </a:r>
-            <a:r>
-              <a:rPr lang="en-US" sz="2000" dirty="0" smtClean="0"/>
-              <a:t> for function execution</a:t>
-            </a:r>
-          </a:p>
-          <a:p>
-            <a:pPr marL="285750" indent="-285750">
-              <a:lnSpc>
-                <a:spcPct val="200000"/>
-              </a:lnSpc>
-              <a:buFont typeface="Arial" panose="020B0604020202020204" pitchFamily="34" charset="0"/>
-              <a:buChar char="•"/>
-            </a:pPr>
-            <a:r>
-              <a:rPr lang="en-US" sz="2000" dirty="0" smtClean="0"/>
-              <a:t> Node.js libraries</a:t>
-            </a:r>
-          </a:p>
-          <a:p>
-            <a:pPr marL="285750" indent="-285750">
-              <a:lnSpc>
-                <a:spcPct val="200000"/>
-              </a:lnSpc>
-              <a:buFont typeface="Arial" panose="020B0604020202020204" pitchFamily="34" charset="0"/>
-              <a:buChar char="•"/>
-            </a:pPr>
-            <a:r>
-              <a:rPr lang="en-US" sz="2000" dirty="0" smtClean="0"/>
-              <a:t>Used Express to create a server </a:t>
-            </a:r>
-          </a:p>
-          <a:p>
-            <a:pPr marL="285750" indent="-285750">
-              <a:lnSpc>
-                <a:spcPct val="200000"/>
-              </a:lnSpc>
-              <a:buFont typeface="Arial" panose="020B0604020202020204" pitchFamily="34" charset="0"/>
-              <a:buChar char="•"/>
-            </a:pPr>
-            <a:r>
-              <a:rPr lang="en-US" sz="2000" dirty="0" smtClean="0"/>
-              <a:t>Used PostgreSQL for the database</a:t>
-            </a:r>
-          </a:p>
-          <a:p>
-            <a:pPr marL="285750" indent="-285750">
-              <a:lnSpc>
-                <a:spcPct val="200000"/>
-              </a:lnSpc>
-              <a:buFont typeface="Arial" panose="020B0604020202020204" pitchFamily="34" charset="0"/>
-              <a:buChar char="•"/>
-            </a:pPr>
-            <a:r>
-              <a:rPr lang="en-US" sz="2000" dirty="0" smtClean="0"/>
-              <a:t> Front End Application was implemented using React</a:t>
-            </a:r>
-            <a:endParaRPr lang="en-US" sz="2000" dirty="0"/>
-          </a:p>
-        </p:txBody>
-      </p:sp>
+      </p:pic>
     </p:spTree>
     <p:extLst>
       <p:ext uri="{BB962C8B-B14F-4D97-AF65-F5344CB8AC3E}">
-        <p14:creationId xmlns:p14="http://schemas.microsoft.com/office/powerpoint/2010/main" val="3727242249"/>
+        <p14:creationId xmlns:p14="http://schemas.microsoft.com/office/powerpoint/2010/main" val="1049065207"/>
       </p:ext>
     </p:extLst>
   </p:cSld>
@@ -3804,6 +3735,175 @@
           <a:p>
             <a:r>
               <a:rPr lang="en-US" dirty="0" smtClean="0"/>
+              <a:t>Overview </a:t>
+            </a:r>
+            <a:endParaRPr lang="en-US" dirty="0"/>
+          </a:p>
+        </p:txBody>
+      </p:sp>
+      <p:sp>
+        <p:nvSpPr>
+          <p:cNvPr id="3" name="TextBox 2"/>
+          <p:cNvSpPr txBox="1"/>
+          <p:nvPr/>
+        </p:nvSpPr>
+        <p:spPr>
+          <a:xfrm>
+            <a:off x="1143000" y="2075329"/>
+            <a:ext cx="6781800" cy="3785652"/>
+          </a:xfrm>
+          <a:prstGeom prst="rect">
+            <a:avLst/>
+          </a:prstGeom>
+          <a:noFill/>
+        </p:spPr>
+        <p:txBody>
+          <a:bodyPr wrap="square" rtlCol="0">
+            <a:spAutoFit/>
+          </a:bodyPr>
+          <a:lstStyle/>
+          <a:p>
+            <a:pPr>
+              <a:lnSpc>
+                <a:spcPct val="200000"/>
+              </a:lnSpc>
+            </a:pPr>
+            <a:r>
+              <a:rPr lang="en-US" sz="2000" dirty="0"/>
+              <a:t>A</a:t>
+            </a:r>
+            <a:r>
+              <a:rPr lang="en-US" sz="2000" dirty="0" smtClean="0"/>
+              <a:t> </a:t>
+            </a:r>
+            <a:r>
+              <a:rPr lang="en-US" sz="2000" dirty="0"/>
+              <a:t>RESTful API was </a:t>
+            </a:r>
+            <a:r>
+              <a:rPr lang="en-US" sz="2000" dirty="0" smtClean="0"/>
+              <a:t>created using: </a:t>
+            </a:r>
+          </a:p>
+          <a:p>
+            <a:pPr marL="285750" indent="-285750">
+              <a:lnSpc>
+                <a:spcPct val="200000"/>
+              </a:lnSpc>
+              <a:buFont typeface="Arial" panose="020B0604020202020204" pitchFamily="34" charset="0"/>
+              <a:buChar char="•"/>
+            </a:pPr>
+            <a:r>
+              <a:rPr lang="en-US" sz="2000" dirty="0" err="1" smtClean="0"/>
+              <a:t>Javascript</a:t>
+            </a:r>
+            <a:r>
+              <a:rPr lang="en-US" sz="2000" dirty="0" smtClean="0"/>
+              <a:t> for function execution</a:t>
+            </a:r>
+          </a:p>
+          <a:p>
+            <a:pPr marL="285750" indent="-285750">
+              <a:lnSpc>
+                <a:spcPct val="200000"/>
+              </a:lnSpc>
+              <a:buFont typeface="Arial" panose="020B0604020202020204" pitchFamily="34" charset="0"/>
+              <a:buChar char="•"/>
+            </a:pPr>
+            <a:r>
+              <a:rPr lang="en-US" sz="2000" dirty="0" smtClean="0"/>
+              <a:t> Node.js libraries</a:t>
+            </a:r>
+          </a:p>
+          <a:p>
+            <a:pPr marL="285750" indent="-285750">
+              <a:lnSpc>
+                <a:spcPct val="200000"/>
+              </a:lnSpc>
+              <a:buFont typeface="Arial" panose="020B0604020202020204" pitchFamily="34" charset="0"/>
+              <a:buChar char="•"/>
+            </a:pPr>
+            <a:r>
+              <a:rPr lang="en-US" sz="2000" dirty="0" smtClean="0"/>
+              <a:t>Used Express to create a server </a:t>
+            </a:r>
+          </a:p>
+          <a:p>
+            <a:pPr marL="285750" indent="-285750">
+              <a:lnSpc>
+                <a:spcPct val="200000"/>
+              </a:lnSpc>
+              <a:buFont typeface="Arial" panose="020B0604020202020204" pitchFamily="34" charset="0"/>
+              <a:buChar char="•"/>
+            </a:pPr>
+            <a:r>
+              <a:rPr lang="en-US" sz="2000" dirty="0" smtClean="0"/>
+              <a:t>Used PostgreSQL for the database</a:t>
+            </a:r>
+          </a:p>
+          <a:p>
+            <a:pPr marL="285750" indent="-285750">
+              <a:lnSpc>
+                <a:spcPct val="200000"/>
+              </a:lnSpc>
+              <a:buFont typeface="Arial" panose="020B0604020202020204" pitchFamily="34" charset="0"/>
+              <a:buChar char="•"/>
+            </a:pPr>
+            <a:r>
+              <a:rPr lang="en-US" sz="2000" dirty="0" smtClean="0"/>
+              <a:t> Front End Application was implemented using React</a:t>
+            </a:r>
+            <a:endParaRPr lang="en-US" sz="2000" dirty="0"/>
+          </a:p>
+        </p:txBody>
+      </p:sp>
+    </p:spTree>
+    <p:extLst>
+      <p:ext uri="{BB962C8B-B14F-4D97-AF65-F5344CB8AC3E}">
+        <p14:creationId xmlns:p14="http://schemas.microsoft.com/office/powerpoint/2010/main" val="3727242249"/>
+      </p:ext>
+    </p:extLst>
+  </p:cSld>
+  <p:clrMapOvr>
+    <a:masterClrMapping/>
+  </p:clrMapOvr>
+</p:sld>
+</file>
+
+<file path=ppt/slides/slide4.xml><?xml version="1.0" encoding="utf-8"?>
+<p:sld xmlns:a="http://schemas.openxmlformats.org/drawingml/2006/main" xmlns:r="http://schemas.openxmlformats.org/officeDocument/2006/relationships" xmlns:p="http://schemas.openxmlformats.org/presentationml/2006/main">
+  <p:cSld>
+    <p:spTree>
+      <p:nvGrpSpPr>
+        <p:cNvPr id="1" name=""/>
+        <p:cNvGrpSpPr/>
+        <p:nvPr/>
+      </p:nvGrpSpPr>
+      <p:grpSpPr>
+        <a:xfrm>
+          <a:off x="0" y="0"/>
+          <a:ext cx="0" cy="0"/>
+          <a:chOff x="0" y="0"/>
+          <a:chExt cx="0" cy="0"/>
+        </a:xfrm>
+      </p:grpSpPr>
+      <p:sp>
+        <p:nvSpPr>
+          <p:cNvPr id="2" name="Title 1"/>
+          <p:cNvSpPr>
+            <a:spLocks noGrp="1"/>
+          </p:cNvSpPr>
+          <p:nvPr>
+            <p:ph type="title"/>
+          </p:nvPr>
+        </p:nvSpPr>
+        <p:spPr/>
+        <p:txBody>
+          <a:bodyPr/>
+          <a:lstStyle/>
+          <a:p>
+            <a:r>
+              <a:rPr lang="en-US" dirty="0" smtClean="0"/>
               <a:t>Functionality</a:t>
             </a:r>
             <a:endParaRPr lang="en-US" dirty="0"/>
@@ -3937,7 +4037,7 @@
 </p:sld>
 </file>
 
-<file path=ppt/slides/slide4.xml><?xml version="1.0" encoding="utf-8"?>
+<file path=ppt/slides/slide5.xml><?xml version="1.0" encoding="utf-8"?>
 <p:sld xmlns:a="http://schemas.openxmlformats.org/drawingml/2006/main" xmlns:r="http://schemas.openxmlformats.org/officeDocument/2006/relationships" xmlns:p="http://schemas.openxmlformats.org/presentationml/2006/main">
   <p:cSld>
     <p:spTree>
@@ -4054,6 +4154,64 @@
       </p:par>
     </p:tnLst>
   </p:timing>
+</p:sld>
+</file>
+
+<file path=ppt/slides/slide6.xml><?xml version="1.0" encoding="utf-8"?>
+<p:sld xmlns:a="http://schemas.openxmlformats.org/drawingml/2006/main" xmlns:r="http://schemas.openxmlformats.org/officeDocument/2006/relationships" xmlns:p="http://schemas.openxmlformats.org/presentationml/2006/main">
+  <p:cSld>
+    <p:spTree>
+      <p:nvGrpSpPr>
+        <p:cNvPr id="1" name=""/>
+        <p:cNvGrpSpPr/>
+        <p:nvPr/>
+      </p:nvGrpSpPr>
+      <p:grpSpPr>
+        <a:xfrm>
+          <a:off x="0" y="0"/>
+          <a:ext cx="0" cy="0"/>
+          <a:chOff x="0" y="0"/>
+          <a:chExt cx="0" cy="0"/>
+        </a:xfrm>
+      </p:grpSpPr>
+      <p:sp>
+        <p:nvSpPr>
+          <p:cNvPr id="2" name="Title 1"/>
+          <p:cNvSpPr>
+            <a:spLocks noGrp="1"/>
+          </p:cNvSpPr>
+          <p:nvPr>
+            <p:ph type="title"/>
+          </p:nvPr>
+        </p:nvSpPr>
+        <p:spPr>
+          <a:xfrm>
+            <a:off x="457200" y="2857500"/>
+            <a:ext cx="8229600" cy="1143000"/>
+          </a:xfrm>
+        </p:spPr>
+        <p:txBody>
+          <a:bodyPr/>
+          <a:lstStyle/>
+          <a:p>
+            <a:r>
+              <a:rPr lang="en-US" dirty="0" smtClean="0"/>
+              <a:t>Thank You</a:t>
+            </a:r>
+            <a:endParaRPr lang="en-US" dirty="0"/>
+          </a:p>
+        </p:txBody>
+      </p:sp>
+    </p:spTree>
+    <p:extLst>
+      <p:ext uri="{BB962C8B-B14F-4D97-AF65-F5344CB8AC3E}">
+        <p14:creationId xmlns:p14="http://schemas.microsoft.com/office/powerpoint/2010/main" val="3561812256"/>
+      </p:ext>
+    </p:extLst>
+  </p:cSld>
+  <p:clrMapOvr>
+    <a:masterClrMapping/>
+  </p:clrMapOvr>
 </p:sld>
 </file>
 

</xml_diff>